<commit_message>
Edited word document and powerpoint
</commit_message>
<xml_diff>
--- a/Documentations/Pacman Revised.pptx
+++ b/Documentations/Pacman Revised.pptx
@@ -10,9 +10,12 @@
     <p:sldId id="259" r:id="rId4"/>
     <p:sldId id="258" r:id="rId5"/>
     <p:sldId id="261" r:id="rId6"/>
-    <p:sldId id="262" r:id="rId7"/>
-    <p:sldId id="260" r:id="rId8"/>
-    <p:sldId id="263" r:id="rId9"/>
+    <p:sldId id="265" r:id="rId7"/>
+    <p:sldId id="262" r:id="rId8"/>
+    <p:sldId id="266" r:id="rId9"/>
+    <p:sldId id="264" r:id="rId10"/>
+    <p:sldId id="267" r:id="rId11"/>
+    <p:sldId id="263" r:id="rId12"/>
   </p:sldIdLst>
   <p:sldSz cx="12192000" cy="6858000"/>
   <p:notesSz cx="6858000" cy="9144000"/>
@@ -344,7 +347,7 @@
             <a:fld id="{B61BEF0D-F0BB-DE4B-95CE-6DB70DBA9567}" type="datetimeFigureOut">
               <a:rPr lang="en-US" dirty="0"/>
               <a:pPr/>
-              <a:t>3/31/2014</a:t>
+              <a:t>5/16/2014</a:t>
             </a:fld>
             <a:endParaRPr lang="en-US" dirty="0"/>
           </a:p>
@@ -675,7 +678,7 @@
             <a:fld id="{B61BEF0D-F0BB-DE4B-95CE-6DB70DBA9567}" type="datetimeFigureOut">
               <a:rPr lang="en-US" dirty="0"/>
               <a:pPr/>
-              <a:t>3/31/2014</a:t>
+              <a:t>5/16/2014</a:t>
             </a:fld>
             <a:endParaRPr lang="en-US" dirty="0"/>
           </a:p>
@@ -950,7 +953,7 @@
             <a:fld id="{B61BEF0D-F0BB-DE4B-95CE-6DB70DBA9567}" type="datetimeFigureOut">
               <a:rPr lang="en-US" dirty="0"/>
               <a:pPr/>
-              <a:t>3/31/2014</a:t>
+              <a:t>5/16/2014</a:t>
             </a:fld>
             <a:endParaRPr lang="en-US" dirty="0"/>
           </a:p>
@@ -1515,7 +1518,7 @@
             <a:fld id="{B61BEF0D-F0BB-DE4B-95CE-6DB70DBA9567}" type="datetimeFigureOut">
               <a:rPr lang="en-US" dirty="0"/>
               <a:pPr/>
-              <a:t>3/31/2014</a:t>
+              <a:t>5/16/2014</a:t>
             </a:fld>
             <a:endParaRPr lang="en-US" dirty="0"/>
           </a:p>
@@ -1790,7 +1793,7 @@
             <a:fld id="{B61BEF0D-F0BB-DE4B-95CE-6DB70DBA9567}" type="datetimeFigureOut">
               <a:rPr lang="en-US" dirty="0"/>
               <a:pPr/>
-              <a:t>3/31/2014</a:t>
+              <a:t>5/16/2014</a:t>
             </a:fld>
             <a:endParaRPr lang="en-US" dirty="0"/>
           </a:p>
@@ -2349,7 +2352,7 @@
             <a:fld id="{B61BEF0D-F0BB-DE4B-95CE-6DB70DBA9567}" type="datetimeFigureOut">
               <a:rPr lang="en-US" dirty="0"/>
               <a:pPr/>
-              <a:t>3/31/2014</a:t>
+              <a:t>5/16/2014</a:t>
             </a:fld>
             <a:endParaRPr lang="en-US" dirty="0"/>
           </a:p>
@@ -2673,7 +2676,7 @@
             <a:fld id="{B61BEF0D-F0BB-DE4B-95CE-6DB70DBA9567}" type="datetimeFigureOut">
               <a:rPr lang="en-US" dirty="0"/>
               <a:pPr/>
-              <a:t>3/31/2014</a:t>
+              <a:t>5/16/2014</a:t>
             </a:fld>
             <a:endParaRPr lang="en-US" dirty="0"/>
           </a:p>
@@ -2847,7 +2850,7 @@
             <a:fld id="{B61BEF0D-F0BB-DE4B-95CE-6DB70DBA9567}" type="datetimeFigureOut">
               <a:rPr lang="en-US" dirty="0"/>
               <a:pPr/>
-              <a:t>3/31/2014</a:t>
+              <a:t>5/16/2014</a:t>
             </a:fld>
             <a:endParaRPr lang="en-US" dirty="0"/>
           </a:p>
@@ -3082,7 +3085,7 @@
             <a:fld id="{B61BEF0D-F0BB-DE4B-95CE-6DB70DBA9567}" type="datetimeFigureOut">
               <a:rPr lang="en-US" dirty="0"/>
               <a:pPr/>
-              <a:t>3/31/2014</a:t>
+              <a:t>5/16/2014</a:t>
             </a:fld>
             <a:endParaRPr lang="en-US" dirty="0"/>
           </a:p>
@@ -3279,7 +3282,7 @@
             <a:fld id="{B61BEF0D-F0BB-DE4B-95CE-6DB70DBA9567}" type="datetimeFigureOut">
               <a:rPr lang="en-US" dirty="0"/>
               <a:pPr/>
-              <a:t>3/31/2014</a:t>
+              <a:t>5/16/2014</a:t>
             </a:fld>
             <a:endParaRPr lang="en-US" dirty="0"/>
           </a:p>
@@ -3552,7 +3555,7 @@
             <a:fld id="{B61BEF0D-F0BB-DE4B-95CE-6DB70DBA9567}" type="datetimeFigureOut">
               <a:rPr lang="en-US" dirty="0"/>
               <a:pPr/>
-              <a:t>3/31/2014</a:t>
+              <a:t>5/16/2014</a:t>
             </a:fld>
             <a:endParaRPr lang="en-US" dirty="0"/>
           </a:p>
@@ -3815,7 +3818,7 @@
             <a:fld id="{B61BEF0D-F0BB-DE4B-95CE-6DB70DBA9567}" type="datetimeFigureOut">
               <a:rPr lang="en-US" dirty="0"/>
               <a:pPr/>
-              <a:t>3/31/2014</a:t>
+              <a:t>5/16/2014</a:t>
             </a:fld>
             <a:endParaRPr lang="en-US" dirty="0"/>
           </a:p>
@@ -4186,7 +4189,7 @@
             <a:fld id="{B61BEF0D-F0BB-DE4B-95CE-6DB70DBA9567}" type="datetimeFigureOut">
               <a:rPr lang="en-US" dirty="0"/>
               <a:pPr/>
-              <a:t>3/31/2014</a:t>
+              <a:t>5/16/2014</a:t>
             </a:fld>
             <a:endParaRPr lang="en-US" dirty="0"/>
           </a:p>
@@ -4331,7 +4334,7 @@
             <a:fld id="{B61BEF0D-F0BB-DE4B-95CE-6DB70DBA9567}" type="datetimeFigureOut">
               <a:rPr lang="en-US" dirty="0"/>
               <a:pPr/>
-              <a:t>3/31/2014</a:t>
+              <a:t>5/16/2014</a:t>
             </a:fld>
             <a:endParaRPr lang="en-US" dirty="0"/>
           </a:p>
@@ -4453,7 +4456,7 @@
             <a:fld id="{B61BEF0D-F0BB-DE4B-95CE-6DB70DBA9567}" type="datetimeFigureOut">
               <a:rPr lang="en-US" dirty="0"/>
               <a:pPr/>
-              <a:t>3/31/2014</a:t>
+              <a:t>5/16/2014</a:t>
             </a:fld>
             <a:endParaRPr lang="en-US" dirty="0"/>
           </a:p>
@@ -4735,7 +4738,7 @@
             <a:fld id="{B61BEF0D-F0BB-DE4B-95CE-6DB70DBA9567}" type="datetimeFigureOut">
               <a:rPr lang="en-US" dirty="0"/>
               <a:pPr/>
-              <a:t>3/31/2014</a:t>
+              <a:t>5/16/2014</a:t>
             </a:fld>
             <a:endParaRPr lang="en-US" dirty="0"/>
           </a:p>
@@ -5056,7 +5059,7 @@
             <a:fld id="{B61BEF0D-F0BB-DE4B-95CE-6DB70DBA9567}" type="datetimeFigureOut">
               <a:rPr lang="en-US" dirty="0"/>
               <a:pPr/>
-              <a:t>3/31/2014</a:t>
+              <a:t>5/16/2014</a:t>
             </a:fld>
             <a:endParaRPr lang="en-US" dirty="0"/>
           </a:p>
@@ -5267,7 +5270,7 @@
             <a:fld id="{B61BEF0D-F0BB-DE4B-95CE-6DB70DBA9567}" type="datetimeFigureOut">
               <a:rPr lang="en-US" dirty="0"/>
               <a:pPr/>
-              <a:t>3/31/2014</a:t>
+              <a:t>5/16/2014</a:t>
             </a:fld>
             <a:endParaRPr lang="en-US" dirty="0"/>
           </a:p>
@@ -5854,6 +5857,241 @@
 </p:sld>
 </file>
 
+<file path=ppt/slides/slide10.xml><?xml version="1.0" encoding="utf-8"?>
+<p:sld xmlns:a="http://schemas.openxmlformats.org/drawingml/2006/main" xmlns:r="http://schemas.openxmlformats.org/officeDocument/2006/relationships" xmlns:p="http://schemas.openxmlformats.org/presentationml/2006/main">
+  <p:cSld>
+    <p:spTree>
+      <p:nvGrpSpPr>
+        <p:cNvPr id="1" name=""/>
+        <p:cNvGrpSpPr/>
+        <p:nvPr/>
+      </p:nvGrpSpPr>
+      <p:grpSpPr>
+        <a:xfrm>
+          <a:off x="0" y="0"/>
+          <a:ext cx="0" cy="0"/>
+          <a:chOff x="0" y="0"/>
+          <a:chExt cx="0" cy="0"/>
+        </a:xfrm>
+      </p:grpSpPr>
+      <p:sp>
+        <p:nvSpPr>
+          <p:cNvPr id="2" name="Title 1"/>
+          <p:cNvSpPr>
+            <a:spLocks noGrp="1"/>
+          </p:cNvSpPr>
+          <p:nvPr>
+            <p:ph type="title"/>
+          </p:nvPr>
+        </p:nvSpPr>
+        <p:spPr/>
+        <p:txBody>
+          <a:bodyPr/>
+          <a:lstStyle/>
+          <a:p>
+            <a:r>
+              <a:rPr lang="en-US" dirty="0" smtClean="0"/>
+              <a:t>A* </a:t>
+            </a:r>
+            <a:r>
+              <a:rPr lang="en-US" dirty="0" err="1" smtClean="0"/>
+              <a:t>ai</a:t>
+            </a:r>
+            <a:r>
+              <a:rPr lang="en-US" dirty="0" smtClean="0"/>
+              <a:t> (Chasing)</a:t>
+            </a:r>
+            <a:endParaRPr lang="en-US" dirty="0"/>
+          </a:p>
+        </p:txBody>
+      </p:sp>
+      <p:sp>
+        <p:nvSpPr>
+          <p:cNvPr id="3" name="Content Placeholder 2"/>
+          <p:cNvSpPr>
+            <a:spLocks noGrp="1"/>
+          </p:cNvSpPr>
+          <p:nvPr>
+            <p:ph idx="1"/>
+          </p:nvPr>
+        </p:nvSpPr>
+        <p:spPr>
+          <a:xfrm>
+            <a:off x="685801" y="2142067"/>
+            <a:ext cx="5156199" cy="3649133"/>
+          </a:xfrm>
+        </p:spPr>
+        <p:txBody>
+          <a:bodyPr/>
+          <a:lstStyle/>
+          <a:p>
+            <a:r>
+              <a:rPr lang="fi-FI" dirty="0"/>
+              <a:t>CalcDistance() calculates the distance between the AI and the Player</a:t>
+            </a:r>
+            <a:endParaRPr lang="en-US" dirty="0" smtClean="0"/>
+          </a:p>
+          <a:p>
+            <a:r>
+              <a:rPr lang="fi-FI" dirty="0"/>
+              <a:t>AStar.Init() takes in the data of the AI and the Player and manipulates them for use in A* Pathfinding</a:t>
+            </a:r>
+            <a:endParaRPr lang="en-US" dirty="0" smtClean="0"/>
+          </a:p>
+          <a:p>
+            <a:r>
+              <a:rPr lang="fi-FI" dirty="0"/>
+              <a:t>AStar.InitAStar() adds the current tile the AI is in to the </a:t>
+            </a:r>
+            <a:r>
+              <a:rPr lang="fi-FI" dirty="0" smtClean="0"/>
+              <a:t>OpenList</a:t>
+            </a:r>
+          </a:p>
+          <a:p>
+            <a:r>
+              <a:rPr lang="fi-FI" dirty="0"/>
+              <a:t>AStar.Iteration()performs the iteration to add tiles into OpenList and CloseList and to plot path from AI to Pacman</a:t>
+            </a:r>
+            <a:endParaRPr lang="en-US" dirty="0" smtClean="0"/>
+          </a:p>
+          <a:p>
+            <a:endParaRPr lang="en-US" dirty="0"/>
+          </a:p>
+        </p:txBody>
+      </p:sp>
+      <p:pic>
+        <p:nvPicPr>
+          <p:cNvPr id="4" name="Picture 3"/>
+          <p:cNvPicPr/>
+          <p:nvPr/>
+        </p:nvPicPr>
+        <p:blipFill>
+          <a:blip r:embed="rId2">
+            <a:extLst>
+              <a:ext uri="{28A0092B-C50C-407E-A947-70E740481C1C}">
+                <a14:useLocalDpi xmlns:a14="http://schemas.microsoft.com/office/drawing/2010/main" val="0"/>
+              </a:ext>
+            </a:extLst>
+          </a:blip>
+          <a:srcRect/>
+          <a:stretch>
+            <a:fillRect/>
+          </a:stretch>
+        </p:blipFill>
+        <p:spPr bwMode="auto">
+          <a:xfrm>
+            <a:off x="6095999" y="2133600"/>
+            <a:ext cx="5732145" cy="3505200"/>
+          </a:xfrm>
+          <a:prstGeom prst="rect">
+            <a:avLst/>
+          </a:prstGeom>
+          <a:noFill/>
+          <a:ln>
+            <a:noFill/>
+          </a:ln>
+        </p:spPr>
+      </p:pic>
+    </p:spTree>
+    <p:extLst>
+      <p:ext uri="{BB962C8B-B14F-4D97-AF65-F5344CB8AC3E}">
+        <p14:creationId xmlns:p14="http://schemas.microsoft.com/office/powerpoint/2010/main" val="2278892678"/>
+      </p:ext>
+    </p:extLst>
+  </p:cSld>
+  <p:clrMapOvr>
+    <a:masterClrMapping/>
+  </p:clrMapOvr>
+  <p:timing>
+    <p:tnLst>
+      <p:par>
+        <p:cTn id="1" dur="indefinite" restart="never" nodeType="tmRoot"/>
+      </p:par>
+    </p:tnLst>
+  </p:timing>
+</p:sld>
+</file>
+
+<file path=ppt/slides/slide11.xml><?xml version="1.0" encoding="utf-8"?>
+<p:sld xmlns:a="http://schemas.openxmlformats.org/drawingml/2006/main" xmlns:r="http://schemas.openxmlformats.org/officeDocument/2006/relationships" xmlns:p="http://schemas.openxmlformats.org/presentationml/2006/main">
+  <p:cSld>
+    <p:spTree>
+      <p:nvGrpSpPr>
+        <p:cNvPr id="1" name=""/>
+        <p:cNvGrpSpPr/>
+        <p:nvPr/>
+      </p:nvGrpSpPr>
+      <p:grpSpPr>
+        <a:xfrm>
+          <a:off x="0" y="0"/>
+          <a:ext cx="0" cy="0"/>
+          <a:chOff x="0" y="0"/>
+          <a:chExt cx="0" cy="0"/>
+        </a:xfrm>
+      </p:grpSpPr>
+      <p:sp>
+        <p:nvSpPr>
+          <p:cNvPr id="2" name="Title 1"/>
+          <p:cNvSpPr>
+            <a:spLocks noGrp="1"/>
+          </p:cNvSpPr>
+          <p:nvPr>
+            <p:ph type="title"/>
+          </p:nvPr>
+        </p:nvSpPr>
+        <p:spPr/>
+        <p:txBody>
+          <a:bodyPr/>
+          <a:lstStyle/>
+          <a:p>
+            <a:r>
+              <a:rPr lang="en-US" dirty="0" smtClean="0"/>
+              <a:t>demo</a:t>
+            </a:r>
+            <a:endParaRPr lang="en-US" dirty="0"/>
+          </a:p>
+        </p:txBody>
+      </p:sp>
+      <p:sp>
+        <p:nvSpPr>
+          <p:cNvPr id="3" name="Content Placeholder 2"/>
+          <p:cNvSpPr>
+            <a:spLocks noGrp="1"/>
+          </p:cNvSpPr>
+          <p:nvPr>
+            <p:ph idx="1"/>
+          </p:nvPr>
+        </p:nvSpPr>
+        <p:spPr/>
+        <p:txBody>
+          <a:bodyPr/>
+          <a:lstStyle/>
+          <a:p>
+            <a:endParaRPr lang="en-US" dirty="0"/>
+          </a:p>
+        </p:txBody>
+      </p:sp>
+    </p:spTree>
+    <p:extLst>
+      <p:ext uri="{BB962C8B-B14F-4D97-AF65-F5344CB8AC3E}">
+        <p14:creationId xmlns:p14="http://schemas.microsoft.com/office/powerpoint/2010/main" val="820756344"/>
+      </p:ext>
+    </p:extLst>
+  </p:cSld>
+  <p:clrMapOvr>
+    <a:masterClrMapping/>
+  </p:clrMapOvr>
+  <p:timing>
+    <p:tnLst>
+      <p:par>
+        <p:cTn id="1" dur="indefinite" restart="never" nodeType="tmRoot"/>
+      </p:par>
+    </p:tnLst>
+  </p:timing>
+</p:sld>
+</file>
+
 <file path=ppt/slides/slide2.xml><?xml version="1.0" encoding="utf-8"?>
 <p:sld xmlns:a="http://schemas.openxmlformats.org/drawingml/2006/main" xmlns:r="http://schemas.openxmlformats.org/officeDocument/2006/relationships" xmlns:p="http://schemas.openxmlformats.org/presentationml/2006/main">
   <p:cSld>
@@ -6116,13 +6354,22 @@
           <a:p>
             <a:r>
               <a:rPr lang="en-US" dirty="0" smtClean="0"/>
-              <a:t>A* Pathfinding</a:t>
-            </a:r>
-          </a:p>
-          <a:p>
+              <a:t>A* </a:t>
+            </a:r>
             <a:r>
               <a:rPr lang="en-US" dirty="0" smtClean="0"/>
-              <a:t>Prediction</a:t>
+              <a:t>AI</a:t>
+            </a:r>
+            <a:r>
+              <a:rPr lang="en-US" dirty="0" smtClean="0"/>
+              <a:t> (Random Movement)</a:t>
+            </a:r>
+            <a:endParaRPr lang="en-US" dirty="0" smtClean="0"/>
+          </a:p>
+          <a:p>
+            <a:r>
+              <a:rPr lang="en-US" dirty="0" smtClean="0"/>
+              <a:t>A* AI (Chasing)</a:t>
             </a:r>
             <a:endParaRPr lang="en-US" dirty="0"/>
           </a:p>
@@ -6208,29 +6455,25 @@
               <a:t>Waypoints are set in the </a:t>
             </a:r>
             <a:r>
+              <a:rPr lang="en-US" dirty="0"/>
+              <a:t>level’s corresponding waypoint level text file</a:t>
+            </a:r>
+            <a:endParaRPr lang="en-US" dirty="0" smtClean="0"/>
+          </a:p>
+          <a:p>
+            <a:r>
+              <a:rPr lang="en-US" dirty="0"/>
+              <a:t>S</a:t>
+            </a:r>
+            <a:r>
               <a:rPr lang="en-US" dirty="0" smtClean="0"/>
-              <a:t>CSV</a:t>
-            </a:r>
-          </a:p>
-          <a:p>
+              <a:t>tored </a:t>
+            </a:r>
             <a:r>
               <a:rPr lang="en-US" dirty="0"/>
-              <a:t>Represented by letters (eg. a, b, c, d</a:t>
-            </a:r>
-            <a:r>
-              <a:rPr lang="en-US" dirty="0" smtClean="0"/>
-              <a:t>)</a:t>
-            </a:r>
-          </a:p>
-          <a:p>
-            <a:r>
-              <a:rPr lang="en-US" dirty="0"/>
-              <a:t>Calculate the direction based on the next waypoint the Ghost is supposed to move </a:t>
-            </a:r>
-            <a:r>
-              <a:rPr lang="en-US" dirty="0" smtClean="0"/>
-              <a:t>to</a:t>
-            </a:r>
+              <a:t>into a list for the AI to traverse through</a:t>
+            </a:r>
+            <a:endParaRPr lang="en-US" dirty="0" smtClean="0"/>
           </a:p>
           <a:p>
             <a:endParaRPr lang="en-US" dirty="0" smtClean="0"/>
@@ -6294,7 +6537,7 @@
           <a:p>
             <a:r>
               <a:rPr lang="en-US" dirty="0" smtClean="0"/>
-              <a:t>A* ai</a:t>
+              <a:t>Waypoint ai</a:t>
             </a:r>
             <a:endParaRPr lang="en-US" dirty="0"/>
           </a:p>
@@ -6310,52 +6553,88 @@
             <p:ph idx="1"/>
           </p:nvPr>
         </p:nvSpPr>
-        <p:spPr/>
-        <p:txBody>
-          <a:bodyPr/>
-          <a:lstStyle/>
-          <a:p>
-            <a:r>
-              <a:rPr lang="en-US" dirty="0"/>
-              <a:t>Check the surrounding blocks by position using the Manhattan </a:t>
-            </a:r>
-            <a:r>
-              <a:rPr lang="en-US" dirty="0" smtClean="0"/>
-              <a:t>formula</a:t>
-            </a:r>
-          </a:p>
-          <a:p>
-            <a:r>
-              <a:rPr lang="en-US" dirty="0"/>
-              <a:t>All 4 paths are pushed into Open List, lowest pushed into Closed </a:t>
-            </a:r>
-            <a:r>
-              <a:rPr lang="en-US" dirty="0" smtClean="0"/>
-              <a:t>List</a:t>
-            </a:r>
-          </a:p>
-          <a:p>
-            <a:r>
-              <a:rPr lang="en-US" dirty="0"/>
-              <a:t>Repeat procedure until it has reached desired outcome</a:t>
-            </a:r>
-            <a:endParaRPr lang="en-US" dirty="0" smtClean="0"/>
-          </a:p>
-          <a:p>
-            <a:endParaRPr lang="en-US" dirty="0"/>
-          </a:p>
-        </p:txBody>
-      </p:sp>
+        <p:spPr>
+          <a:xfrm>
+            <a:off x="685801" y="2142067"/>
+            <a:ext cx="5105399" cy="3649133"/>
+          </a:xfrm>
+        </p:spPr>
+        <p:txBody>
+          <a:bodyPr/>
+          <a:lstStyle/>
+          <a:p>
+            <a:r>
+              <a:rPr lang="fi-FI" dirty="0" smtClean="0"/>
+              <a:t>MoveAI</a:t>
+            </a:r>
+            <a:r>
+              <a:rPr lang="fi-FI" dirty="0"/>
+              <a:t>() is to traverse through the list of waypoints that were set in the Level Editor in the particular </a:t>
+            </a:r>
+            <a:r>
+              <a:rPr lang="fi-FI" dirty="0" smtClean="0"/>
+              <a:t>level</a:t>
+            </a:r>
+          </a:p>
+          <a:p>
+            <a:r>
+              <a:rPr lang="fi-FI" dirty="0"/>
+              <a:t>AI “Ping-Pong’s” back and forth towards the AI’s respective positions in the list</a:t>
+            </a:r>
+            <a:endParaRPr lang="en-US" dirty="0"/>
+          </a:p>
+        </p:txBody>
+      </p:sp>
+      <p:pic>
+        <p:nvPicPr>
+          <p:cNvPr id="5" name="Picture 4" descr="Description: Macintosh HD:Users:Kinnear:Desktop:Screen Shot 2014-05-12 at 9.13.19 pm.png"/>
+          <p:cNvPicPr/>
+          <p:nvPr/>
+        </p:nvPicPr>
+        <p:blipFill>
+          <a:blip r:embed="rId2">
+            <a:extLst>
+              <a:ext uri="{28A0092B-C50C-407E-A947-70E740481C1C}">
+                <a14:useLocalDpi xmlns:a14="http://schemas.microsoft.com/office/drawing/2010/main" val="0"/>
+              </a:ext>
+            </a:extLst>
+          </a:blip>
+          <a:srcRect/>
+          <a:stretch>
+            <a:fillRect/>
+          </a:stretch>
+        </p:blipFill>
+        <p:spPr bwMode="auto">
+          <a:xfrm>
+            <a:off x="6052820" y="1825307"/>
+            <a:ext cx="5267960" cy="4121785"/>
+          </a:xfrm>
+          <a:prstGeom prst="rect">
+            <a:avLst/>
+          </a:prstGeom>
+          <a:noFill/>
+          <a:ln>
+            <a:noFill/>
+          </a:ln>
+        </p:spPr>
+      </p:pic>
     </p:spTree>
     <p:extLst>
       <p:ext uri="{BB962C8B-B14F-4D97-AF65-F5344CB8AC3E}">
-        <p14:creationId xmlns:p14="http://schemas.microsoft.com/office/powerpoint/2010/main" val="3132631588"/>
+        <p14:creationId xmlns:p14="http://schemas.microsoft.com/office/powerpoint/2010/main" val="1119385437"/>
       </p:ext>
     </p:extLst>
   </p:cSld>
   <p:clrMapOvr>
     <a:masterClrMapping/>
   </p:clrMapOvr>
+  <p:timing>
+    <p:tnLst>
+      <p:par>
+        <p:cTn id="1" dur="indefinite" restart="never" nodeType="tmRoot"/>
+      </p:par>
+    </p:tnLst>
+  </p:timing>
 </p:sld>
 </file>
 
@@ -6393,7 +6672,15 @@
           <a:p>
             <a:r>
               <a:rPr lang="en-US" dirty="0" smtClean="0"/>
-              <a:t>Prediction</a:t>
+              <a:t>A* </a:t>
+            </a:r>
+            <a:r>
+              <a:rPr lang="en-US" dirty="0" err="1" smtClean="0"/>
+              <a:t>ai</a:t>
+            </a:r>
+            <a:r>
+              <a:rPr lang="en-US" dirty="0" smtClean="0"/>
+              <a:t> (Random Movement)</a:t>
             </a:r>
             <a:endParaRPr lang="en-US" dirty="0"/>
           </a:p>
@@ -6416,36 +6703,36 @@
           <a:p>
             <a:r>
               <a:rPr lang="en-US" dirty="0"/>
-              <a:t>There will be a Raytrace in front of the </a:t>
+              <a:t>AI picks a random spot on the </a:t>
             </a:r>
             <a:r>
               <a:rPr lang="en-US" dirty="0" smtClean="0"/>
-              <a:t>Player</a:t>
-            </a:r>
-          </a:p>
-          <a:p>
-            <a:r>
-              <a:rPr lang="en-US" dirty="0"/>
-              <a:t>Get Player’s position, calculate the direction and move the Ghost in the calculated </a:t>
-            </a:r>
+              <a:t>map</a:t>
+            </a:r>
+          </a:p>
+          <a:p>
             <a:r>
               <a:rPr lang="en-US" dirty="0" smtClean="0"/>
-              <a:t>direction</a:t>
-            </a:r>
-          </a:p>
-          <a:p>
-            <a:r>
-              <a:rPr lang="en-US" dirty="0"/>
-              <a:t>Also make use of A*</a:t>
-            </a:r>
-            <a:endParaRPr lang="en-US" b="1" dirty="0"/>
+              <a:t>Spot is not an environmental tile</a:t>
+            </a:r>
+            <a:endParaRPr lang="en-US" dirty="0" smtClean="0"/>
+          </a:p>
+          <a:p>
+            <a:r>
+              <a:rPr lang="en-US" dirty="0" smtClean="0"/>
+              <a:t>Use A* to plot path towards the randomly selected spot</a:t>
+            </a:r>
+            <a:endParaRPr lang="en-US" dirty="0" smtClean="0"/>
+          </a:p>
+          <a:p>
+            <a:endParaRPr lang="en-US" dirty="0"/>
           </a:p>
         </p:txBody>
       </p:sp>
     </p:spTree>
     <p:extLst>
       <p:ext uri="{BB962C8B-B14F-4D97-AF65-F5344CB8AC3E}">
-        <p14:creationId xmlns:p14="http://schemas.microsoft.com/office/powerpoint/2010/main" val="1027663062"/>
+        <p14:creationId xmlns:p14="http://schemas.microsoft.com/office/powerpoint/2010/main" val="3132631588"/>
       </p:ext>
     </p:extLst>
   </p:cSld>
@@ -6496,7 +6783,15 @@
           <a:p>
             <a:r>
               <a:rPr lang="en-US" dirty="0" smtClean="0"/>
-              <a:t>demo</a:t>
+              <a:t>A* </a:t>
+            </a:r>
+            <a:r>
+              <a:rPr lang="en-US" dirty="0" err="1" smtClean="0"/>
+              <a:t>ai</a:t>
+            </a:r>
+            <a:r>
+              <a:rPr lang="en-US" dirty="0" smtClean="0"/>
+              <a:t> (Random Movement)</a:t>
             </a:r>
             <a:endParaRPr lang="en-US" dirty="0"/>
           </a:p>
@@ -6512,25 +6807,202 @@
             <p:ph idx="1"/>
           </p:nvPr>
         </p:nvSpPr>
-        <p:spPr/>
-        <p:txBody>
-          <a:bodyPr/>
-          <a:lstStyle/>
-          <a:p>
-            <a:endParaRPr lang="en-US" dirty="0"/>
-          </a:p>
-        </p:txBody>
-      </p:sp>
+        <p:spPr>
+          <a:xfrm>
+            <a:off x="685802" y="2142067"/>
+            <a:ext cx="5058176" cy="3649133"/>
+          </a:xfrm>
+        </p:spPr>
+        <p:txBody>
+          <a:bodyPr/>
+          <a:lstStyle/>
+          <a:p>
+            <a:r>
+              <a:rPr lang="fi-FI" dirty="0"/>
+              <a:t>CalculatePath() runs at an interval set in the Unity </a:t>
+            </a:r>
+            <a:r>
+              <a:rPr lang="fi-FI" dirty="0" smtClean="0"/>
+              <a:t>Editor</a:t>
+            </a:r>
+          </a:p>
+          <a:p>
+            <a:r>
+              <a:rPr lang="fi-FI" dirty="0"/>
+              <a:t>CalculatePath() is to calculate the desired path of the AI towards a target by the A* algorithm</a:t>
+            </a:r>
+            <a:endParaRPr lang="en-US" dirty="0" smtClean="0"/>
+          </a:p>
+          <a:p>
+            <a:r>
+              <a:rPr lang="fi-FI" dirty="0"/>
+              <a:t>Move() moves the AI towards targeted positions in the list of nodes stored</a:t>
+            </a:r>
+            <a:endParaRPr lang="en-US" dirty="0" smtClean="0"/>
+          </a:p>
+          <a:p>
+            <a:endParaRPr lang="en-US" dirty="0"/>
+          </a:p>
+        </p:txBody>
+      </p:sp>
+      <p:pic>
+        <p:nvPicPr>
+          <p:cNvPr id="5" name="Picture 4" descr="Description: Macintosh HD:Users:Kinnear:Desktop:Screen Shot 2014-05-12 at 9.08.09 pm.png"/>
+          <p:cNvPicPr/>
+          <p:nvPr/>
+        </p:nvPicPr>
+        <p:blipFill>
+          <a:blip r:embed="rId2">
+            <a:extLst>
+              <a:ext uri="{28A0092B-C50C-407E-A947-70E740481C1C}">
+                <a14:useLocalDpi xmlns:a14="http://schemas.microsoft.com/office/drawing/2010/main" val="0"/>
+              </a:ext>
+            </a:extLst>
+          </a:blip>
+          <a:srcRect/>
+          <a:stretch>
+            <a:fillRect/>
+          </a:stretch>
+        </p:blipFill>
+        <p:spPr bwMode="auto">
+          <a:xfrm>
+            <a:off x="6052820" y="2780664"/>
+            <a:ext cx="5267960" cy="1910715"/>
+          </a:xfrm>
+          <a:prstGeom prst="rect">
+            <a:avLst/>
+          </a:prstGeom>
+          <a:noFill/>
+          <a:ln>
+            <a:noFill/>
+          </a:ln>
+        </p:spPr>
+      </p:pic>
     </p:spTree>
     <p:extLst>
       <p:ext uri="{BB962C8B-B14F-4D97-AF65-F5344CB8AC3E}">
-        <p14:creationId xmlns:p14="http://schemas.microsoft.com/office/powerpoint/2010/main" val="820756344"/>
+        <p14:creationId xmlns:p14="http://schemas.microsoft.com/office/powerpoint/2010/main" val="1783794538"/>
       </p:ext>
     </p:extLst>
   </p:cSld>
   <p:clrMapOvr>
     <a:masterClrMapping/>
   </p:clrMapOvr>
+  <p:timing>
+    <p:tnLst>
+      <p:par>
+        <p:cTn id="1" dur="indefinite" restart="never" nodeType="tmRoot"/>
+      </p:par>
+    </p:tnLst>
+  </p:timing>
+</p:sld>
+</file>
+
+<file path=ppt/slides/slide9.xml><?xml version="1.0" encoding="utf-8"?>
+<p:sld xmlns:a="http://schemas.openxmlformats.org/drawingml/2006/main" xmlns:r="http://schemas.openxmlformats.org/officeDocument/2006/relationships" xmlns:p="http://schemas.openxmlformats.org/presentationml/2006/main">
+  <p:cSld>
+    <p:spTree>
+      <p:nvGrpSpPr>
+        <p:cNvPr id="1" name=""/>
+        <p:cNvGrpSpPr/>
+        <p:nvPr/>
+      </p:nvGrpSpPr>
+      <p:grpSpPr>
+        <a:xfrm>
+          <a:off x="0" y="0"/>
+          <a:ext cx="0" cy="0"/>
+          <a:chOff x="0" y="0"/>
+          <a:chExt cx="0" cy="0"/>
+        </a:xfrm>
+      </p:grpSpPr>
+      <p:sp>
+        <p:nvSpPr>
+          <p:cNvPr id="2" name="Title 1"/>
+          <p:cNvSpPr>
+            <a:spLocks noGrp="1"/>
+          </p:cNvSpPr>
+          <p:nvPr>
+            <p:ph type="title"/>
+          </p:nvPr>
+        </p:nvSpPr>
+        <p:spPr/>
+        <p:txBody>
+          <a:bodyPr/>
+          <a:lstStyle/>
+          <a:p>
+            <a:r>
+              <a:rPr lang="en-US" dirty="0" smtClean="0"/>
+              <a:t>A* </a:t>
+            </a:r>
+            <a:r>
+              <a:rPr lang="en-US" dirty="0" err="1" smtClean="0"/>
+              <a:t>ai</a:t>
+            </a:r>
+            <a:r>
+              <a:rPr lang="en-US" dirty="0" smtClean="0"/>
+              <a:t> (Chasing)</a:t>
+            </a:r>
+            <a:endParaRPr lang="en-US" dirty="0"/>
+          </a:p>
+        </p:txBody>
+      </p:sp>
+      <p:sp>
+        <p:nvSpPr>
+          <p:cNvPr id="3" name="Content Placeholder 2"/>
+          <p:cNvSpPr>
+            <a:spLocks noGrp="1"/>
+          </p:cNvSpPr>
+          <p:nvPr>
+            <p:ph idx="1"/>
+          </p:nvPr>
+        </p:nvSpPr>
+        <p:spPr/>
+        <p:txBody>
+          <a:bodyPr/>
+          <a:lstStyle/>
+          <a:p>
+            <a:r>
+              <a:rPr lang="en-US" dirty="0" smtClean="0"/>
+              <a:t>Take effect only when Pac – Man is within range</a:t>
+            </a:r>
+            <a:endParaRPr lang="en-US" dirty="0" smtClean="0"/>
+          </a:p>
+          <a:p>
+            <a:r>
+              <a:rPr lang="en-US" dirty="0" smtClean="0"/>
+              <a:t>Pac – Man’s position is set as the AI’s destination</a:t>
+            </a:r>
+            <a:endParaRPr lang="en-US" dirty="0" smtClean="0"/>
+          </a:p>
+          <a:p>
+            <a:r>
+              <a:rPr lang="en-US" dirty="0" smtClean="0"/>
+              <a:t>Use A* to plot a path from the AI’s current position to the destination</a:t>
+            </a:r>
+            <a:endParaRPr lang="en-US" dirty="0" smtClean="0"/>
+          </a:p>
+          <a:p>
+            <a:endParaRPr lang="en-US" dirty="0"/>
+          </a:p>
+        </p:txBody>
+      </p:sp>
+    </p:spTree>
+    <p:extLst>
+      <p:ext uri="{BB962C8B-B14F-4D97-AF65-F5344CB8AC3E}">
+        <p14:creationId xmlns:p14="http://schemas.microsoft.com/office/powerpoint/2010/main" val="353224748"/>
+      </p:ext>
+    </p:extLst>
+  </p:cSld>
+  <p:clrMapOvr>
+    <a:masterClrMapping/>
+  </p:clrMapOvr>
+  <p:timing>
+    <p:tnLst>
+      <p:par>
+        <p:cTn id="1" dur="indefinite" restart="never" nodeType="tmRoot"/>
+      </p:par>
+    </p:tnLst>
+  </p:timing>
 </p:sld>
 </file>
 
@@ -6777,7 +7249,7 @@
   <a:extraClrSchemeLst/>
   <a:extLst>
     <a:ext uri="{05A4C25C-085E-4340-85A3-A5531E510DB2}">
-      <thm15:themeFamily xmlns:thm15="http://schemas.microsoft.com/office/thememl/2012/main" name="Celestial" id="{C4BB2A3D-0E93-4C5F-B0D2-9D3FCE089CC5}" vid="{42E5908D-19A2-46FD-89FA-638B126129EF}"/>
+      <thm15:themeFamily xmlns:thm15="http://schemas.microsoft.com/office/thememl/2012/main" xmlns="" name="Celestial" id="{C4BB2A3D-0E93-4C5F-B0D2-9D3FCE089CC5}" vid="{42E5908D-19A2-46FD-89FA-638B126129EF}"/>
     </a:ext>
   </a:extLst>
 </a:theme>

</xml_diff>

<commit_message>
Edited word document and powerpoint (II)
</commit_message>
<xml_diff>
--- a/Documentations/Pacman Revised.pptx
+++ b/Documentations/Pacman Revised.pptx
@@ -15,7 +15,11 @@
     <p:sldId id="266" r:id="rId9"/>
     <p:sldId id="264" r:id="rId10"/>
     <p:sldId id="267" r:id="rId11"/>
-    <p:sldId id="263" r:id="rId12"/>
+    <p:sldId id="268" r:id="rId12"/>
+    <p:sldId id="269" r:id="rId13"/>
+    <p:sldId id="270" r:id="rId14"/>
+    <p:sldId id="271" r:id="rId15"/>
+    <p:sldId id="263" r:id="rId16"/>
   </p:sldIdLst>
   <p:sldSz cx="12192000" cy="6858000"/>
   <p:notesSz cx="6858000" cy="9144000"/>
@@ -5899,7 +5903,11 @@
             </a:r>
             <a:r>
               <a:rPr lang="en-US" dirty="0" smtClean="0"/>
-              <a:t> (Chasing)</a:t>
+              <a:t> (</a:t>
+            </a:r>
+            <a:r>
+              <a:rPr lang="en-US" dirty="0" smtClean="0"/>
+              <a:t>Chasing Within range)</a:t>
             </a:r>
             <a:endParaRPr lang="en-US" dirty="0"/>
           </a:p>
@@ -6047,6 +6055,566 @@
           <a:p>
             <a:r>
               <a:rPr lang="en-US" dirty="0" smtClean="0"/>
+              <a:t>A* </a:t>
+            </a:r>
+            <a:r>
+              <a:rPr lang="en-US" dirty="0" err="1" smtClean="0"/>
+              <a:t>ai</a:t>
+            </a:r>
+            <a:r>
+              <a:rPr lang="en-US" dirty="0" smtClean="0"/>
+              <a:t> (Chasing)</a:t>
+            </a:r>
+            <a:endParaRPr lang="en-US" dirty="0"/>
+          </a:p>
+        </p:txBody>
+      </p:sp>
+      <p:sp>
+        <p:nvSpPr>
+          <p:cNvPr id="3" name="Content Placeholder 2"/>
+          <p:cNvSpPr>
+            <a:spLocks noGrp="1"/>
+          </p:cNvSpPr>
+          <p:nvPr>
+            <p:ph idx="1"/>
+          </p:nvPr>
+        </p:nvSpPr>
+        <p:spPr/>
+        <p:txBody>
+          <a:bodyPr/>
+          <a:lstStyle/>
+          <a:p>
+            <a:r>
+              <a:rPr lang="fi-FI" dirty="0"/>
+              <a:t>Uses A* Algorithm to calculate </a:t>
+            </a:r>
+            <a:r>
+              <a:rPr lang="fi-FI" dirty="0" smtClean="0"/>
+              <a:t>path</a:t>
+            </a:r>
+          </a:p>
+          <a:p>
+            <a:r>
+              <a:rPr lang="fi-FI" dirty="0" smtClean="0"/>
+              <a:t> </a:t>
+            </a:r>
+            <a:r>
+              <a:rPr lang="fi-FI" dirty="0"/>
+              <a:t>Pass in array of Game Objects as </a:t>
+            </a:r>
+            <a:r>
+              <a:rPr lang="fi-FI" dirty="0" smtClean="0"/>
+              <a:t>Graph</a:t>
+            </a:r>
+          </a:p>
+          <a:p>
+            <a:r>
+              <a:rPr lang="fi-FI" dirty="0" smtClean="0"/>
+              <a:t> </a:t>
+            </a:r>
+            <a:r>
+              <a:rPr lang="fi-FI" dirty="0"/>
+              <a:t>Pass in Start Point in </a:t>
+            </a:r>
+            <a:r>
+              <a:rPr lang="fi-FI" dirty="0" smtClean="0"/>
+              <a:t>Source.</a:t>
+            </a:r>
+          </a:p>
+          <a:p>
+            <a:r>
+              <a:rPr lang="fi-FI" dirty="0" smtClean="0"/>
+              <a:t>Pass </a:t>
+            </a:r>
+            <a:r>
+              <a:rPr lang="fi-FI" dirty="0"/>
+              <a:t>in End Point in </a:t>
+            </a:r>
+            <a:r>
+              <a:rPr lang="fi-FI" dirty="0" smtClean="0"/>
+              <a:t>Target</a:t>
+            </a:r>
+          </a:p>
+          <a:p>
+            <a:r>
+              <a:rPr lang="fi-FI" dirty="0" smtClean="0"/>
+              <a:t> </a:t>
+            </a:r>
+            <a:r>
+              <a:rPr lang="fi-FI" dirty="0"/>
+              <a:t>Returns a stack of GameObjects for movement</a:t>
+            </a:r>
+            <a:endParaRPr lang="en-US" dirty="0"/>
+          </a:p>
+        </p:txBody>
+      </p:sp>
+    </p:spTree>
+    <p:extLst>
+      <p:ext uri="{BB962C8B-B14F-4D97-AF65-F5344CB8AC3E}">
+        <p14:creationId xmlns:p14="http://schemas.microsoft.com/office/powerpoint/2010/main" val="1900601333"/>
+      </p:ext>
+    </p:extLst>
+  </p:cSld>
+  <p:clrMapOvr>
+    <a:masterClrMapping/>
+  </p:clrMapOvr>
+  <p:timing>
+    <p:tnLst>
+      <p:par>
+        <p:cTn id="1" dur="indefinite" restart="never" nodeType="tmRoot"/>
+      </p:par>
+    </p:tnLst>
+  </p:timing>
+</p:sld>
+</file>
+
+<file path=ppt/slides/slide12.xml><?xml version="1.0" encoding="utf-8"?>
+<p:sld xmlns:a="http://schemas.openxmlformats.org/drawingml/2006/main" xmlns:r="http://schemas.openxmlformats.org/officeDocument/2006/relationships" xmlns:p="http://schemas.openxmlformats.org/presentationml/2006/main">
+  <p:cSld>
+    <p:spTree>
+      <p:nvGrpSpPr>
+        <p:cNvPr id="1" name=""/>
+        <p:cNvGrpSpPr/>
+        <p:nvPr/>
+      </p:nvGrpSpPr>
+      <p:grpSpPr>
+        <a:xfrm>
+          <a:off x="0" y="0"/>
+          <a:ext cx="0" cy="0"/>
+          <a:chOff x="0" y="0"/>
+          <a:chExt cx="0" cy="0"/>
+        </a:xfrm>
+      </p:grpSpPr>
+      <p:sp>
+        <p:nvSpPr>
+          <p:cNvPr id="2" name="Title 1"/>
+          <p:cNvSpPr>
+            <a:spLocks noGrp="1"/>
+          </p:cNvSpPr>
+          <p:nvPr>
+            <p:ph type="title"/>
+          </p:nvPr>
+        </p:nvSpPr>
+        <p:spPr/>
+        <p:txBody>
+          <a:bodyPr/>
+          <a:lstStyle/>
+          <a:p>
+            <a:r>
+              <a:rPr lang="en-US" dirty="0" smtClean="0"/>
+              <a:t>A* </a:t>
+            </a:r>
+            <a:r>
+              <a:rPr lang="en-US" dirty="0" err="1" smtClean="0"/>
+              <a:t>ai</a:t>
+            </a:r>
+            <a:r>
+              <a:rPr lang="en-US" dirty="0" smtClean="0"/>
+              <a:t> (Chasing)</a:t>
+            </a:r>
+            <a:endParaRPr lang="en-US" dirty="0"/>
+          </a:p>
+        </p:txBody>
+      </p:sp>
+      <p:pic>
+        <p:nvPicPr>
+          <p:cNvPr id="6" name="Picture 5" descr="C:\Users\KBI13XZhiZF\Desktop\AStar.png"/>
+          <p:cNvPicPr/>
+          <p:nvPr/>
+        </p:nvPicPr>
+        <p:blipFill>
+          <a:blip r:embed="rId2">
+            <a:extLst>
+              <a:ext uri="{28A0092B-C50C-407E-A947-70E740481C1C}">
+                <a14:useLocalDpi xmlns:a14="http://schemas.microsoft.com/office/drawing/2010/main" val="0"/>
+              </a:ext>
+            </a:extLst>
+          </a:blip>
+          <a:srcRect/>
+          <a:stretch>
+            <a:fillRect/>
+          </a:stretch>
+        </p:blipFill>
+        <p:spPr bwMode="auto">
+          <a:xfrm>
+            <a:off x="727075" y="1809750"/>
+            <a:ext cx="6115050" cy="4438650"/>
+          </a:xfrm>
+          <a:prstGeom prst="rect">
+            <a:avLst/>
+          </a:prstGeom>
+          <a:solidFill>
+            <a:srgbClr val="FFFFFF">
+              <a:shade val="85000"/>
+            </a:srgbClr>
+          </a:solidFill>
+          <a:ln w="88900" cap="sq">
+            <a:solidFill>
+              <a:srgbClr val="FFFFFF"/>
+            </a:solidFill>
+            <a:miter lim="800000"/>
+          </a:ln>
+          <a:effectLst>
+            <a:outerShdw blurRad="55000" dist="18000" dir="5400000" algn="tl" rotWithShape="0">
+              <a:srgbClr val="000000">
+                <a:alpha val="40000"/>
+              </a:srgbClr>
+            </a:outerShdw>
+          </a:effectLst>
+          <a:scene3d>
+            <a:camera prst="orthographicFront"/>
+            <a:lightRig rig="twoPt" dir="t">
+              <a:rot lat="0" lon="0" rev="7200000"/>
+            </a:lightRig>
+          </a:scene3d>
+          <a:sp3d>
+            <a:bevelT w="25400" h="19050"/>
+            <a:contourClr>
+              <a:srgbClr val="FFFFFF"/>
+            </a:contourClr>
+          </a:sp3d>
+        </p:spPr>
+      </p:pic>
+    </p:spTree>
+    <p:extLst>
+      <p:ext uri="{BB962C8B-B14F-4D97-AF65-F5344CB8AC3E}">
+        <p14:creationId xmlns:p14="http://schemas.microsoft.com/office/powerpoint/2010/main" val="3294388626"/>
+      </p:ext>
+    </p:extLst>
+  </p:cSld>
+  <p:clrMapOvr>
+    <a:masterClrMapping/>
+  </p:clrMapOvr>
+  <p:timing>
+    <p:tnLst>
+      <p:par>
+        <p:cTn id="1" dur="indefinite" restart="never" nodeType="tmRoot"/>
+      </p:par>
+    </p:tnLst>
+  </p:timing>
+</p:sld>
+</file>
+
+<file path=ppt/slides/slide13.xml><?xml version="1.0" encoding="utf-8"?>
+<p:sld xmlns:a="http://schemas.openxmlformats.org/drawingml/2006/main" xmlns:r="http://schemas.openxmlformats.org/officeDocument/2006/relationships" xmlns:p="http://schemas.openxmlformats.org/presentationml/2006/main">
+  <p:cSld>
+    <p:spTree>
+      <p:nvGrpSpPr>
+        <p:cNvPr id="1" name=""/>
+        <p:cNvGrpSpPr/>
+        <p:nvPr/>
+      </p:nvGrpSpPr>
+      <p:grpSpPr>
+        <a:xfrm>
+          <a:off x="0" y="0"/>
+          <a:ext cx="0" cy="0"/>
+          <a:chOff x="0" y="0"/>
+          <a:chExt cx="0" cy="0"/>
+        </a:xfrm>
+      </p:grpSpPr>
+      <p:sp>
+        <p:nvSpPr>
+          <p:cNvPr id="2" name="Title 1"/>
+          <p:cNvSpPr>
+            <a:spLocks noGrp="1"/>
+          </p:cNvSpPr>
+          <p:nvPr>
+            <p:ph type="title"/>
+          </p:nvPr>
+        </p:nvSpPr>
+        <p:spPr/>
+        <p:txBody>
+          <a:bodyPr/>
+          <a:lstStyle/>
+          <a:p>
+            <a:r>
+              <a:rPr lang="en-US" dirty="0" err="1" smtClean="0"/>
+              <a:t>Dijkstra</a:t>
+            </a:r>
+            <a:r>
+              <a:rPr lang="en-US" dirty="0" smtClean="0"/>
+              <a:t> </a:t>
+            </a:r>
+            <a:r>
+              <a:rPr lang="en-US" dirty="0" err="1" smtClean="0"/>
+              <a:t>ai</a:t>
+            </a:r>
+            <a:r>
+              <a:rPr lang="en-US" dirty="0" smtClean="0"/>
+              <a:t> (Chasing)</a:t>
+            </a:r>
+            <a:endParaRPr lang="en-US" dirty="0"/>
+          </a:p>
+        </p:txBody>
+      </p:sp>
+      <p:sp>
+        <p:nvSpPr>
+          <p:cNvPr id="3" name="Content Placeholder 2"/>
+          <p:cNvSpPr>
+            <a:spLocks noGrp="1"/>
+          </p:cNvSpPr>
+          <p:nvPr>
+            <p:ph idx="1"/>
+          </p:nvPr>
+        </p:nvSpPr>
+        <p:spPr/>
+        <p:txBody>
+          <a:bodyPr/>
+          <a:lstStyle/>
+          <a:p>
+            <a:r>
+              <a:rPr lang="fi-FI" dirty="0"/>
+              <a:t>Uses Dijkstra Algorithm to calculate </a:t>
+            </a:r>
+            <a:r>
+              <a:rPr lang="fi-FI" dirty="0" smtClean="0"/>
+              <a:t>path</a:t>
+            </a:r>
+          </a:p>
+          <a:p>
+            <a:r>
+              <a:rPr lang="fi-FI" dirty="0" smtClean="0"/>
+              <a:t> </a:t>
+            </a:r>
+            <a:r>
+              <a:rPr lang="fi-FI" dirty="0"/>
+              <a:t>Pass in array of Game Objects as </a:t>
+            </a:r>
+            <a:r>
+              <a:rPr lang="fi-FI" dirty="0" smtClean="0"/>
+              <a:t>Graph</a:t>
+            </a:r>
+          </a:p>
+          <a:p>
+            <a:r>
+              <a:rPr lang="fi-FI" dirty="0" smtClean="0"/>
+              <a:t> </a:t>
+            </a:r>
+            <a:r>
+              <a:rPr lang="fi-FI" dirty="0"/>
+              <a:t>Pass in Start Point in </a:t>
+            </a:r>
+            <a:r>
+              <a:rPr lang="fi-FI" dirty="0" smtClean="0"/>
+              <a:t>Source</a:t>
+            </a:r>
+          </a:p>
+          <a:p>
+            <a:r>
+              <a:rPr lang="fi-FI" dirty="0" smtClean="0"/>
+              <a:t> </a:t>
+            </a:r>
+            <a:r>
+              <a:rPr lang="fi-FI" dirty="0"/>
+              <a:t>Pass in End Point in </a:t>
+            </a:r>
+            <a:r>
+              <a:rPr lang="fi-FI" dirty="0" smtClean="0"/>
+              <a:t>Target</a:t>
+            </a:r>
+          </a:p>
+          <a:p>
+            <a:r>
+              <a:rPr lang="fi-FI" dirty="0" smtClean="0"/>
+              <a:t> </a:t>
+            </a:r>
+            <a:r>
+              <a:rPr lang="fi-FI" dirty="0"/>
+              <a:t>Returns a stack of GameObjects for </a:t>
+            </a:r>
+            <a:r>
+              <a:rPr lang="fi-FI" dirty="0" smtClean="0"/>
+              <a:t>movement</a:t>
+            </a:r>
+            <a:endParaRPr lang="en-SG" dirty="0"/>
+          </a:p>
+        </p:txBody>
+      </p:sp>
+    </p:spTree>
+    <p:extLst>
+      <p:ext uri="{BB962C8B-B14F-4D97-AF65-F5344CB8AC3E}">
+        <p14:creationId xmlns:p14="http://schemas.microsoft.com/office/powerpoint/2010/main" val="1900601333"/>
+      </p:ext>
+    </p:extLst>
+  </p:cSld>
+  <p:clrMapOvr>
+    <a:masterClrMapping/>
+  </p:clrMapOvr>
+  <p:timing>
+    <p:tnLst>
+      <p:par>
+        <p:cTn id="1" dur="indefinite" restart="never" nodeType="tmRoot"/>
+      </p:par>
+    </p:tnLst>
+  </p:timing>
+</p:sld>
+</file>
+
+<file path=ppt/slides/slide14.xml><?xml version="1.0" encoding="utf-8"?>
+<p:sld xmlns:a="http://schemas.openxmlformats.org/drawingml/2006/main" xmlns:r="http://schemas.openxmlformats.org/officeDocument/2006/relationships" xmlns:p="http://schemas.openxmlformats.org/presentationml/2006/main">
+  <p:cSld>
+    <p:spTree>
+      <p:nvGrpSpPr>
+        <p:cNvPr id="1" name=""/>
+        <p:cNvGrpSpPr/>
+        <p:nvPr/>
+      </p:nvGrpSpPr>
+      <p:grpSpPr>
+        <a:xfrm>
+          <a:off x="0" y="0"/>
+          <a:ext cx="0" cy="0"/>
+          <a:chOff x="0" y="0"/>
+          <a:chExt cx="0" cy="0"/>
+        </a:xfrm>
+      </p:grpSpPr>
+      <p:sp>
+        <p:nvSpPr>
+          <p:cNvPr id="2" name="Title 1"/>
+          <p:cNvSpPr>
+            <a:spLocks noGrp="1"/>
+          </p:cNvSpPr>
+          <p:nvPr>
+            <p:ph type="title"/>
+          </p:nvPr>
+        </p:nvSpPr>
+        <p:spPr/>
+        <p:txBody>
+          <a:bodyPr/>
+          <a:lstStyle/>
+          <a:p>
+            <a:r>
+              <a:rPr lang="en-US" dirty="0" err="1" smtClean="0"/>
+              <a:t>Dijkstra</a:t>
+            </a:r>
+            <a:r>
+              <a:rPr lang="en-US" dirty="0" smtClean="0"/>
+              <a:t> </a:t>
+            </a:r>
+            <a:r>
+              <a:rPr lang="en-US" dirty="0" err="1" smtClean="0"/>
+              <a:t>ai</a:t>
+            </a:r>
+            <a:r>
+              <a:rPr lang="en-US" dirty="0" smtClean="0"/>
+              <a:t> (Chasing)</a:t>
+            </a:r>
+            <a:endParaRPr lang="en-US" dirty="0"/>
+          </a:p>
+        </p:txBody>
+      </p:sp>
+      <p:pic>
+        <p:nvPicPr>
+          <p:cNvPr id="6" name="Picture 5" descr="C:\Users\KBI13XZhiZF\Desktop\Dijkstra.png"/>
+          <p:cNvPicPr/>
+          <p:nvPr/>
+        </p:nvPicPr>
+        <p:blipFill>
+          <a:blip r:embed="rId2">
+            <a:extLst>
+              <a:ext uri="{28A0092B-C50C-407E-A947-70E740481C1C}">
+                <a14:useLocalDpi xmlns:a14="http://schemas.microsoft.com/office/drawing/2010/main" val="0"/>
+              </a:ext>
+            </a:extLst>
+          </a:blip>
+          <a:srcRect/>
+          <a:stretch>
+            <a:fillRect/>
+          </a:stretch>
+        </p:blipFill>
+        <p:spPr bwMode="auto">
+          <a:xfrm>
+            <a:off x="790575" y="1800225"/>
+            <a:ext cx="5886450" cy="4625975"/>
+          </a:xfrm>
+          <a:prstGeom prst="rect">
+            <a:avLst/>
+          </a:prstGeom>
+          <a:solidFill>
+            <a:srgbClr val="FFFFFF">
+              <a:shade val="85000"/>
+            </a:srgbClr>
+          </a:solidFill>
+          <a:ln w="88900" cap="sq">
+            <a:solidFill>
+              <a:srgbClr val="FFFFFF"/>
+            </a:solidFill>
+            <a:miter lim="800000"/>
+          </a:ln>
+          <a:effectLst>
+            <a:outerShdw blurRad="55000" dist="18000" dir="5400000" algn="tl" rotWithShape="0">
+              <a:srgbClr val="000000">
+                <a:alpha val="40000"/>
+              </a:srgbClr>
+            </a:outerShdw>
+          </a:effectLst>
+          <a:scene3d>
+            <a:camera prst="orthographicFront"/>
+            <a:lightRig rig="twoPt" dir="t">
+              <a:rot lat="0" lon="0" rev="7200000"/>
+            </a:lightRig>
+          </a:scene3d>
+          <a:sp3d>
+            <a:bevelT w="25400" h="19050"/>
+            <a:contourClr>
+              <a:srgbClr val="FFFFFF"/>
+            </a:contourClr>
+          </a:sp3d>
+        </p:spPr>
+      </p:pic>
+    </p:spTree>
+    <p:extLst>
+      <p:ext uri="{BB962C8B-B14F-4D97-AF65-F5344CB8AC3E}">
+        <p14:creationId xmlns:p14="http://schemas.microsoft.com/office/powerpoint/2010/main" val="3294388626"/>
+      </p:ext>
+    </p:extLst>
+  </p:cSld>
+  <p:clrMapOvr>
+    <a:masterClrMapping/>
+  </p:clrMapOvr>
+  <p:timing>
+    <p:tnLst>
+      <p:par>
+        <p:cTn id="1" dur="indefinite" restart="never" nodeType="tmRoot"/>
+      </p:par>
+    </p:tnLst>
+  </p:timing>
+</p:sld>
+</file>
+
+<file path=ppt/slides/slide15.xml><?xml version="1.0" encoding="utf-8"?>
+<p:sld xmlns:a="http://schemas.openxmlformats.org/drawingml/2006/main" xmlns:r="http://schemas.openxmlformats.org/officeDocument/2006/relationships" xmlns:p="http://schemas.openxmlformats.org/presentationml/2006/main">
+  <p:cSld>
+    <p:spTree>
+      <p:nvGrpSpPr>
+        <p:cNvPr id="1" name=""/>
+        <p:cNvGrpSpPr/>
+        <p:nvPr/>
+      </p:nvGrpSpPr>
+      <p:grpSpPr>
+        <a:xfrm>
+          <a:off x="0" y="0"/>
+          <a:ext cx="0" cy="0"/>
+          <a:chOff x="0" y="0"/>
+          <a:chExt cx="0" cy="0"/>
+        </a:xfrm>
+      </p:grpSpPr>
+      <p:sp>
+        <p:nvSpPr>
+          <p:cNvPr id="2" name="Title 1"/>
+          <p:cNvSpPr>
+            <a:spLocks noGrp="1"/>
+          </p:cNvSpPr>
+          <p:nvPr>
+            <p:ph type="title"/>
+          </p:nvPr>
+        </p:nvSpPr>
+        <p:spPr/>
+        <p:txBody>
+          <a:bodyPr/>
+          <a:lstStyle/>
+          <a:p>
+            <a:r>
+              <a:rPr lang="en-US" dirty="0" smtClean="0"/>
               <a:t>demo</a:t>
             </a:r>
             <a:endParaRPr lang="en-US" dirty="0"/>
@@ -6354,22 +6922,33 @@
           <a:p>
             <a:r>
               <a:rPr lang="en-US" dirty="0" smtClean="0"/>
-              <a:t>A* </a:t>
-            </a:r>
+              <a:t>A* AI (Random Movement)</a:t>
+            </a:r>
+          </a:p>
+          <a:p>
             <a:r>
               <a:rPr lang="en-US" dirty="0" smtClean="0"/>
-              <a:t>AI</a:t>
+              <a:t>A* AI (</a:t>
             </a:r>
             <a:r>
               <a:rPr lang="en-US" dirty="0" smtClean="0"/>
-              <a:t> (Random Movement)</a:t>
-            </a:r>
-            <a:endParaRPr lang="en-US" dirty="0" smtClean="0"/>
+              <a:t>Chasing Within Range)</a:t>
+            </a:r>
           </a:p>
           <a:p>
             <a:r>
               <a:rPr lang="en-US" dirty="0" smtClean="0"/>
               <a:t>A* AI (Chasing)</a:t>
+            </a:r>
+          </a:p>
+          <a:p>
+            <a:r>
+              <a:rPr lang="en-US" dirty="0" err="1" smtClean="0"/>
+              <a:t>Dijkstra</a:t>
+            </a:r>
+            <a:r>
+              <a:rPr lang="en-US" dirty="0" smtClean="0"/>
+              <a:t> AI (Chasing)</a:t>
             </a:r>
             <a:endParaRPr lang="en-US" dirty="0"/>
           </a:p>
@@ -6452,11 +7031,7 @@
           <a:p>
             <a:r>
               <a:rPr lang="en-US" dirty="0"/>
-              <a:t>Waypoints are set in the </a:t>
-            </a:r>
-            <a:r>
-              <a:rPr lang="en-US" dirty="0"/>
-              <a:t>level’s corresponding waypoint level text file</a:t>
+              <a:t>Waypoints are set in the level’s corresponding waypoint level text file</a:t>
             </a:r>
             <a:endParaRPr lang="en-US" dirty="0" smtClean="0"/>
           </a:p>
@@ -6715,14 +7290,12 @@
               <a:rPr lang="en-US" dirty="0" smtClean="0"/>
               <a:t>Spot is not an environmental tile</a:t>
             </a:r>
-            <a:endParaRPr lang="en-US" dirty="0" smtClean="0"/>
           </a:p>
           <a:p>
             <a:r>
               <a:rPr lang="en-US" dirty="0" smtClean="0"/>
               <a:t>Use A* to plot path towards the randomly selected spot</a:t>
             </a:r>
-            <a:endParaRPr lang="en-US" dirty="0" smtClean="0"/>
           </a:p>
           <a:p>
             <a:endParaRPr lang="en-US" dirty="0"/>
@@ -6940,7 +7513,11 @@
             </a:r>
             <a:r>
               <a:rPr lang="en-US" dirty="0" smtClean="0"/>
-              <a:t> (Chasing)</a:t>
+              <a:t> (</a:t>
+            </a:r>
+            <a:r>
+              <a:rPr lang="en-US" dirty="0" smtClean="0"/>
+              <a:t>Chasing Within range)</a:t>
             </a:r>
             <a:endParaRPr lang="en-US" dirty="0"/>
           </a:p>
@@ -6965,21 +7542,18 @@
               <a:rPr lang="en-US" dirty="0" smtClean="0"/>
               <a:t>Take effect only when Pac – Man is within range</a:t>
             </a:r>
-            <a:endParaRPr lang="en-US" dirty="0" smtClean="0"/>
           </a:p>
           <a:p>
             <a:r>
               <a:rPr lang="en-US" dirty="0" smtClean="0"/>
               <a:t>Pac – Man’s position is set as the AI’s destination</a:t>
             </a:r>
-            <a:endParaRPr lang="en-US" dirty="0" smtClean="0"/>
           </a:p>
           <a:p>
             <a:r>
               <a:rPr lang="en-US" dirty="0" smtClean="0"/>
               <a:t>Use A* to plot a path from the AI’s current position to the destination</a:t>
             </a:r>
-            <a:endParaRPr lang="en-US" dirty="0" smtClean="0"/>
           </a:p>
           <a:p>
             <a:endParaRPr lang="en-US" dirty="0"/>
@@ -7249,7 +7823,7 @@
   <a:extraClrSchemeLst/>
   <a:extLst>
     <a:ext uri="{05A4C25C-085E-4340-85A3-A5531E510DB2}">
-      <thm15:themeFamily xmlns:thm15="http://schemas.microsoft.com/office/thememl/2012/main" xmlns="" name="Celestial" id="{C4BB2A3D-0E93-4C5F-B0D2-9D3FCE089CC5}" vid="{42E5908D-19A2-46FD-89FA-638B126129EF}"/>
+      <thm15:themeFamily xmlns="" xmlns:thm15="http://schemas.microsoft.com/office/thememl/2012/main" name="Celestial" id="{C4BB2A3D-0E93-4C5F-B0D2-9D3FCE089CC5}" vid="{42E5908D-19A2-46FD-89FA-638B126129EF}"/>
     </a:ext>
   </a:extLst>
 </a:theme>

</xml_diff>